<commit_message>
did graph wrong oops
</commit_message>
<xml_diff>
--- a/presentations/problem_presentation.pptx
+++ b/presentations/problem_presentation.pptx
@@ -7395,10 +7395,10 @@
       </p:sp>
       <p:pic>
         <p:nvPicPr>
-          <p:cNvPr id="5" name="Picture 4" descr="A picture containing watch&#10;&#10;Description automatically generated">
+          <p:cNvPr id="6" name="Picture 5" descr="Shape&#10;&#10;Description automatically generated">
             <a:extLst>
               <a:ext uri="{FF2B5EF4-FFF2-40B4-BE49-F238E27FC236}">
-                <a16:creationId xmlns:a16="http://schemas.microsoft.com/office/drawing/2014/main" id="{C54B1821-07E5-BCDB-5348-A262F19FF922}"/>
+                <a16:creationId xmlns:a16="http://schemas.microsoft.com/office/drawing/2014/main" id="{11860910-22A0-9EEE-2542-F3FDDCE3A01F}"/>
               </a:ext>
             </a:extLst>
           </p:cNvPr>
@@ -7415,13 +7415,13 @@
               </a:ext>
             </a:extLst>
           </a:blip>
-          <a:srcRect l="9393" t="10007" r="9637" b="26641"/>
+          <a:srcRect l="16427" t="8248" r="17659" b="7768"/>
           <a:stretch/>
         </p:blipFill>
         <p:spPr>
           <a:xfrm>
-            <a:off x="5076825" y="1904999"/>
-            <a:ext cx="4457700" cy="3487735"/>
+            <a:off x="5219699" y="1609725"/>
+            <a:ext cx="3248025" cy="4138448"/>
           </a:xfrm>
           <a:prstGeom prst="rect">
             <a:avLst/>
@@ -7578,18 +7578,22 @@
               <a:buNone/>
             </a:pPr>
             <a:r>
+              <a:rPr lang="en-US" sz="2400"/>
+              <a:t>Minimum </a:t>
+            </a:r>
+            <a:r>
               <a:rPr lang="en-US" sz="2400" dirty="0"/>
-              <a:t>Minimum number of colors: 3</a:t>
+              <a:t>number of colors: 3</a:t>
             </a:r>
           </a:p>
         </p:txBody>
       </p:sp>
       <p:pic>
         <p:nvPicPr>
-          <p:cNvPr id="9" name="Picture 8" descr="A picture containing shape&#10;&#10;Description automatically generated">
+          <p:cNvPr id="5" name="Picture 4" descr="A picture containing shape&#10;&#10;Description automatically generated">
             <a:extLst>
               <a:ext uri="{FF2B5EF4-FFF2-40B4-BE49-F238E27FC236}">
-                <a16:creationId xmlns:a16="http://schemas.microsoft.com/office/drawing/2014/main" id="{620EF9F7-AFAF-BBDF-FD5B-68050E752099}"/>
+                <a16:creationId xmlns:a16="http://schemas.microsoft.com/office/drawing/2014/main" id="{16DB9CBE-A173-2153-A017-412A3AC50391}"/>
               </a:ext>
             </a:extLst>
           </p:cNvPr>
@@ -7606,13 +7610,59 @@
               </a:ext>
             </a:extLst>
           </a:blip>
-          <a:srcRect l="6667" t="18416" r="8148" b="20782"/>
+          <a:srcRect l="20772" t="7819" r="22130" b="8493"/>
           <a:stretch/>
         </p:blipFill>
         <p:spPr>
           <a:xfrm>
-            <a:off x="5229932" y="1726387"/>
-            <a:ext cx="3771007" cy="2691626"/>
+            <a:off x="6048375" y="1773551"/>
+            <a:ext cx="2644117" cy="3875412"/>
+          </a:xfrm>
+          <a:prstGeom prst="rect">
+            <a:avLst/>
+          </a:prstGeom>
+        </p:spPr>
+      </p:pic>
+      <p:pic>
+        <p:nvPicPr>
+          <p:cNvPr id="7" name="Picture 6" descr="Diagram&#10;&#10;Description automatically generated">
+            <a:extLst>
+              <a:ext uri="{FF2B5EF4-FFF2-40B4-BE49-F238E27FC236}">
+                <a16:creationId xmlns:a16="http://schemas.microsoft.com/office/drawing/2014/main" id="{A6467E3A-F1A2-12D5-61F4-CE1931FC0A7F}"/>
+              </a:ext>
+            </a:extLst>
+          </p:cNvPr>
+          <p:cNvPicPr>
+            <a:picLocks noChangeAspect="1"/>
+          </p:cNvPicPr>
+          <p:nvPr/>
+        </p:nvPicPr>
+        <p:blipFill rotWithShape="1">
+          <a:blip r:embed="rId3">
+            <a:extLst>
+              <a:ext uri="{BEBA8EAE-BF5A-486C-A8C5-ECC9F3942E4B}">
+                <a14:imgProps xmlns:a14="http://schemas.microsoft.com/office/drawing/2010/main">
+                  <a14:imgLayer r:embed="rId4">
+                    <a14:imgEffect>
+                      <a14:backgroundRemoval t="22804" b="34206" l="37692" r="48232">
+                        <a14:foregroundMark x1="40432" y1="24383" x2="42593" y2="30556"/>
+                      </a14:backgroundRemoval>
+                    </a14:imgEffect>
+                  </a14:imgLayer>
+                </a14:imgProps>
+              </a:ext>
+              <a:ext uri="{28A0092B-C50C-407E-A947-70E740481C1C}">
+                <a14:useLocalDpi xmlns:a14="http://schemas.microsoft.com/office/drawing/2010/main" val="0"/>
+              </a:ext>
+            </a:extLst>
+          </a:blip>
+          <a:srcRect l="36374" t="21379" r="50450" b="64369"/>
+          <a:stretch/>
+        </p:blipFill>
+        <p:spPr>
+          <a:xfrm>
+            <a:off x="8007676" y="2874832"/>
+            <a:ext cx="612281" cy="662297"/>
           </a:xfrm>
           <a:prstGeom prst="rect">
             <a:avLst/>
@@ -7634,20 +7684,31 @@
           <p:nvPr/>
         </p:nvPicPr>
         <p:blipFill rotWithShape="1">
-          <a:blip r:embed="rId3">
+          <a:blip r:embed="rId5">
             <a:extLst>
+              <a:ext uri="{BEBA8EAE-BF5A-486C-A8C5-ECC9F3942E4B}">
+                <a14:imgProps xmlns:a14="http://schemas.microsoft.com/office/drawing/2010/main">
+                  <a14:imgLayer r:embed="rId6">
+                    <a14:imgEffect>
+                      <a14:backgroundRemoval t="31841" b="42781" l="78420" r="88829">
+                        <a14:foregroundMark x1="82099" y1="37346" x2="85185" y2="38580"/>
+                      </a14:backgroundRemoval>
+                    </a14:imgEffect>
+                  </a14:imgLayer>
+                </a14:imgProps>
+              </a:ext>
               <a:ext uri="{28A0092B-C50C-407E-A947-70E740481C1C}">
                 <a14:useLocalDpi xmlns:a14="http://schemas.microsoft.com/office/drawing/2010/main" val="0"/>
               </a:ext>
             </a:extLst>
           </a:blip>
-          <a:srcRect l="77191" t="27160" r="8920" b="52289"/>
+          <a:srcRect l="77119" t="30474" r="9870" b="55852"/>
           <a:stretch/>
         </p:blipFill>
         <p:spPr>
           <a:xfrm>
-            <a:off x="8354839" y="2084221"/>
-            <a:ext cx="599850" cy="887580"/>
+            <a:off x="7912594" y="4823935"/>
+            <a:ext cx="612281" cy="643415"/>
           </a:xfrm>
           <a:prstGeom prst="rect">
             <a:avLst/>
@@ -7656,10 +7717,10 @@
       </p:pic>
       <p:pic>
         <p:nvPicPr>
-          <p:cNvPr id="13" name="Picture 12" descr="A picture containing text, orange, vector graphics&#10;&#10;Description automatically generated">
+          <p:cNvPr id="8" name="Picture 7" descr="A picture containing text, orange&#10;&#10;Description automatically generated">
             <a:extLst>
               <a:ext uri="{FF2B5EF4-FFF2-40B4-BE49-F238E27FC236}">
-                <a16:creationId xmlns:a16="http://schemas.microsoft.com/office/drawing/2014/main" id="{ADDF002A-A302-DC35-203A-58B7E5196A20}"/>
+                <a16:creationId xmlns:a16="http://schemas.microsoft.com/office/drawing/2014/main" id="{4522D987-8136-9C54-B341-F868FE440D42}"/>
               </a:ext>
             </a:extLst>
           </p:cNvPr>
@@ -7669,55 +7730,31 @@
           <p:nvPr/>
         </p:nvPicPr>
         <p:blipFill rotWithShape="1">
-          <a:blip r:embed="rId3">
+          <a:blip r:embed="rId7">
             <a:extLst>
+              <a:ext uri="{BEBA8EAE-BF5A-486C-A8C5-ECC9F3942E4B}">
+                <a14:imgProps xmlns:a14="http://schemas.microsoft.com/office/drawing/2010/main">
+                  <a14:imgLayer r:embed="rId8">
+                    <a14:imgEffect>
+                      <a14:backgroundRemoval t="11574" b="25154" l="25695" r="38795">
+                        <a14:foregroundMark x1="31173" y1="17284" x2="33025" y2="20679"/>
+                      </a14:backgroundRemoval>
+                    </a14:imgEffect>
+                  </a14:imgLayer>
+                </a14:imgProps>
+              </a:ext>
               <a:ext uri="{28A0092B-C50C-407E-A947-70E740481C1C}">
                 <a14:useLocalDpi xmlns:a14="http://schemas.microsoft.com/office/drawing/2010/main" val="0"/>
               </a:ext>
             </a:extLst>
           </a:blip>
-          <a:srcRect l="10002" t="55817" r="77262" b="29938"/>
+          <a:srcRect l="24058" t="9876" r="59568" b="73149"/>
           <a:stretch/>
         </p:blipFill>
         <p:spPr>
           <a:xfrm>
-            <a:off x="5363282" y="3381375"/>
-            <a:ext cx="589843" cy="659765"/>
-          </a:xfrm>
-          <a:prstGeom prst="rect">
-            <a:avLst/>
-          </a:prstGeom>
-        </p:spPr>
-      </p:pic>
-      <p:pic>
-        <p:nvPicPr>
-          <p:cNvPr id="7" name="Picture 6" descr="Diagram&#10;&#10;Description automatically generated">
-            <a:extLst>
-              <a:ext uri="{FF2B5EF4-FFF2-40B4-BE49-F238E27FC236}">
-                <a16:creationId xmlns:a16="http://schemas.microsoft.com/office/drawing/2014/main" id="{A6467E3A-F1A2-12D5-61F4-CE1931FC0A7F}"/>
-              </a:ext>
-            </a:extLst>
-          </p:cNvPr>
-          <p:cNvPicPr>
-            <a:picLocks noChangeAspect="1"/>
-          </p:cNvPicPr>
-          <p:nvPr/>
-        </p:nvPicPr>
-        <p:blipFill rotWithShape="1">
-          <a:blip r:embed="rId4">
-            <a:extLst>
-              <a:ext uri="{28A0092B-C50C-407E-A947-70E740481C1C}">
-                <a14:useLocalDpi xmlns:a14="http://schemas.microsoft.com/office/drawing/2010/main" val="0"/>
-              </a:ext>
-            </a:extLst>
-          </a:blip>
-          <a:srcRect l="36374" t="21379" r="50450" b="64369"/>
-          <a:stretch/>
-        </p:blipFill>
-        <p:spPr>
-          <a:xfrm>
-            <a:off x="6534635" y="1835586"/>
-            <a:ext cx="599850" cy="648851"/>
+            <a:off x="6188887" y="1840227"/>
+            <a:ext cx="797475" cy="826774"/>
           </a:xfrm>
           <a:prstGeom prst="rect">
             <a:avLst/>

</xml_diff>